<commit_message>
update Recette client et descriptif fonctionnel
</commit_message>
<xml_diff>
--- a/documentation/Livrables/Descriptif fonctionnel.pptx
+++ b/documentation/Livrables/Descriptif fonctionnel.pptx
@@ -9,6 +9,11 @@
     <p:sldId id="257" r:id="rId3"/>
     <p:sldId id="258" r:id="rId4"/>
     <p:sldId id="259" r:id="rId5"/>
+    <p:sldId id="260" r:id="rId6"/>
+    <p:sldId id="261" r:id="rId7"/>
+    <p:sldId id="262" r:id="rId8"/>
+    <p:sldId id="264" r:id="rId9"/>
+    <p:sldId id="263" r:id="rId10"/>
   </p:sldIdLst>
   <p:sldSz cx="12192000" cy="6858000"/>
   <p:notesSz cx="6858000" cy="9144000"/>
@@ -4431,8 +4436,8 @@
         </p:nvSpPr>
         <p:spPr>
           <a:xfrm>
-            <a:off x="6481823" y="5094093"/>
-            <a:ext cx="5267342" cy="595037"/>
+            <a:off x="6481823" y="5169329"/>
+            <a:ext cx="5267342" cy="438960"/>
           </a:xfrm>
           <a:prstGeom prst="rect">
             <a:avLst/>
@@ -4449,6 +4454,74 @@
               <a:rPr lang="fr-FR" sz="1400" dirty="0"/>
               <a:t>Un bouton permettant au visiteur de passer à l’étape suivante.</a:t>
             </a:r>
+          </a:p>
+        </p:txBody>
+      </p:sp>
+      <p:pic>
+        <p:nvPicPr>
+          <p:cNvPr id="32" name="Image 31"/>
+          <p:cNvPicPr/>
+          <p:nvPr/>
+        </p:nvPicPr>
+        <p:blipFill>
+          <a:blip r:embed="rId3"/>
+          <a:stretch>
+            <a:fillRect/>
+          </a:stretch>
+        </p:blipFill>
+        <p:spPr>
+          <a:xfrm>
+            <a:off x="6481823" y="55943"/>
+            <a:ext cx="5629312" cy="1054400"/>
+          </a:xfrm>
+          <a:prstGeom prst="rect">
+            <a:avLst/>
+          </a:prstGeom>
+        </p:spPr>
+      </p:pic>
+      <p:sp>
+        <p:nvSpPr>
+          <p:cNvPr id="33" name="Rectangle à coins arrondis 32"/>
+          <p:cNvSpPr/>
+          <p:nvPr/>
+        </p:nvSpPr>
+        <p:spPr>
+          <a:xfrm>
+            <a:off x="7063273" y="587829"/>
+            <a:ext cx="877078" cy="457200"/>
+          </a:xfrm>
+          <a:prstGeom prst="roundRect">
+            <a:avLst/>
+          </a:prstGeom>
+          <a:noFill/>
+          <a:ln w="28575">
+            <a:solidFill>
+              <a:schemeClr val="tx1"/>
+            </a:solidFill>
+          </a:ln>
+        </p:spPr>
+        <p:style>
+          <a:lnRef idx="2">
+            <a:schemeClr val="accent1">
+              <a:shade val="50000"/>
+            </a:schemeClr>
+          </a:lnRef>
+          <a:fillRef idx="1">
+            <a:schemeClr val="accent1"/>
+          </a:fillRef>
+          <a:effectRef idx="0">
+            <a:schemeClr val="accent1"/>
+          </a:effectRef>
+          <a:fontRef idx="minor">
+            <a:schemeClr val="lt1"/>
+          </a:fontRef>
+        </p:style>
+        <p:txBody>
+          <a:bodyPr rtlCol="0" anchor="ctr"/>
+          <a:lstStyle/>
+          <a:p>
+            <a:pPr algn="ctr"/>
+            <a:endParaRPr lang="fr-FR"/>
           </a:p>
         </p:txBody>
       </p:sp>
@@ -4611,8 +4684,8 @@
         </p:nvSpPr>
         <p:spPr>
           <a:xfrm>
-            <a:off x="3145154" y="2509918"/>
-            <a:ext cx="3514726" cy="632460"/>
+            <a:off x="3145153" y="2509918"/>
+            <a:ext cx="7275711" cy="316231"/>
           </a:xfrm>
           <a:prstGeom prst="rect">
             <a:avLst/>
@@ -4686,8 +4759,8 @@
         </p:nvSpPr>
         <p:spPr>
           <a:xfrm>
-            <a:off x="3145154" y="3142378"/>
-            <a:ext cx="3514726" cy="721637"/>
+            <a:off x="3145153" y="2887468"/>
+            <a:ext cx="8396058" cy="721637"/>
           </a:xfrm>
           <a:prstGeom prst="rect">
             <a:avLst/>
@@ -4718,7 +4791,7 @@
             </a:r>
             <a:r>
               <a:rPr lang="fr-FR" sz="1100" dirty="0"/>
-              <a:t> permettant de retirer ce tarif de sa commande.</a:t>
+              <a:t> permettant de retirer ce tarif de sa commande. En cas d’utilisation, d’un de ces boutons, une fonction JS est activée afin de mettre à jour le tableau de synthèse de la commande si besoin (totaux prix et nombre d’entrée). Cette fonction JS met également à jour la zone de synthèse du nombre d’entrée demandé par le client correspondant à ce tarif.</a:t>
             </a:r>
           </a:p>
         </p:txBody>
@@ -4778,7 +4851,7 @@
         <p:spPr>
           <a:xfrm>
             <a:off x="3145154" y="3875496"/>
-            <a:ext cx="3514726" cy="485775"/>
+            <a:ext cx="8321916" cy="350515"/>
           </a:xfrm>
           <a:prstGeom prst="rect">
             <a:avLst/>
@@ -4847,7 +4920,7 @@
         <p:spPr>
           <a:xfrm flipV="1">
             <a:off x="2802168" y="3370025"/>
-            <a:ext cx="342986" cy="157164"/>
+            <a:ext cx="438742" cy="157164"/>
           </a:xfrm>
           <a:prstGeom prst="straightConnector1">
             <a:avLst/>
@@ -4910,10 +4983,2391 @@
           </a:fontRef>
         </p:style>
       </p:cxnSp>
+      <p:pic>
+        <p:nvPicPr>
+          <p:cNvPr id="17" name="Image 16"/>
+          <p:cNvPicPr>
+            <a:picLocks noChangeAspect="1"/>
+          </p:cNvPicPr>
+          <p:nvPr/>
+        </p:nvPicPr>
+        <p:blipFill rotWithShape="1">
+          <a:blip r:embed="rId3"/>
+          <a:srcRect l="2347"/>
+          <a:stretch/>
+        </p:blipFill>
+        <p:spPr>
+          <a:xfrm>
+            <a:off x="410525" y="4534062"/>
+            <a:ext cx="2734628" cy="600075"/>
+          </a:xfrm>
+          <a:prstGeom prst="rect">
+            <a:avLst/>
+          </a:prstGeom>
+        </p:spPr>
+      </p:pic>
+      <p:cxnSp>
+        <p:nvCxnSpPr>
+          <p:cNvPr id="18" name="Connecteur droit avec flèche 17"/>
+          <p:cNvCxnSpPr/>
+          <p:nvPr/>
+        </p:nvCxnSpPr>
+        <p:spPr>
+          <a:xfrm flipV="1">
+            <a:off x="3151689" y="4687330"/>
+            <a:ext cx="431770" cy="12108"/>
+          </a:xfrm>
+          <a:prstGeom prst="straightConnector1">
+            <a:avLst/>
+          </a:prstGeom>
+          <a:ln>
+            <a:solidFill>
+              <a:srgbClr val="FF0000"/>
+            </a:solidFill>
+            <a:tailEnd type="triangle"/>
+          </a:ln>
+        </p:spPr>
+        <p:style>
+          <a:lnRef idx="1">
+            <a:schemeClr val="accent1"/>
+          </a:lnRef>
+          <a:fillRef idx="0">
+            <a:schemeClr val="accent1"/>
+          </a:fillRef>
+          <a:effectRef idx="0">
+            <a:schemeClr val="accent1"/>
+          </a:effectRef>
+          <a:fontRef idx="minor">
+            <a:schemeClr val="tx1"/>
+          </a:fontRef>
+        </p:style>
+      </p:cxnSp>
+      <p:sp>
+        <p:nvSpPr>
+          <p:cNvPr id="20" name="ZoneTexte 19"/>
+          <p:cNvSpPr txBox="1"/>
+          <p:nvPr/>
+        </p:nvSpPr>
+        <p:spPr>
+          <a:xfrm>
+            <a:off x="3511737" y="4517868"/>
+            <a:ext cx="7275711" cy="316231"/>
+          </a:xfrm>
+          <a:prstGeom prst="rect">
+            <a:avLst/>
+          </a:prstGeom>
+          <a:noFill/>
+        </p:spPr>
+        <p:txBody>
+          <a:bodyPr wrap="square" rtlCol="0">
+            <a:noAutofit/>
+          </a:bodyPr>
+          <a:lstStyle/>
+          <a:p>
+            <a:r>
+              <a:rPr lang="fr-FR" sz="1100" dirty="0"/>
+              <a:t>A chaque changement du jour, du mois ou de l’année, une fonction JS est activée qui contrôle si la capacité du Louvre n’est pas dépassé. Pour cela, une commande AJAX est lancé avec le serveur pour récupérer le nombre de place disponible au jour demandé par le visiteur. En cas de dépassement de la capacité, un message d’alerte est remonté au visiteur, afin qu’il change cette date.</a:t>
+            </a:r>
+          </a:p>
+        </p:txBody>
+      </p:sp>
+      <p:pic>
+        <p:nvPicPr>
+          <p:cNvPr id="21" name="Image 20"/>
+          <p:cNvPicPr>
+            <a:picLocks noChangeAspect="1"/>
+          </p:cNvPicPr>
+          <p:nvPr/>
+        </p:nvPicPr>
+        <p:blipFill>
+          <a:blip r:embed="rId4"/>
+          <a:stretch>
+            <a:fillRect/>
+          </a:stretch>
+        </p:blipFill>
+        <p:spPr>
+          <a:xfrm>
+            <a:off x="1758339" y="5359961"/>
+            <a:ext cx="757936" cy="908093"/>
+          </a:xfrm>
+          <a:prstGeom prst="rect">
+            <a:avLst/>
+          </a:prstGeom>
+        </p:spPr>
+      </p:pic>
+      <p:cxnSp>
+        <p:nvCxnSpPr>
+          <p:cNvPr id="22" name="Connecteur droit avec flèche 21"/>
+          <p:cNvCxnSpPr/>
+          <p:nvPr/>
+        </p:nvCxnSpPr>
+        <p:spPr>
+          <a:xfrm>
+            <a:off x="2541891" y="5804257"/>
+            <a:ext cx="1041568" cy="9750"/>
+          </a:xfrm>
+          <a:prstGeom prst="straightConnector1">
+            <a:avLst/>
+          </a:prstGeom>
+          <a:ln>
+            <a:solidFill>
+              <a:srgbClr val="FF0000"/>
+            </a:solidFill>
+            <a:tailEnd type="triangle"/>
+          </a:ln>
+        </p:spPr>
+        <p:style>
+          <a:lnRef idx="1">
+            <a:schemeClr val="accent1"/>
+          </a:lnRef>
+          <a:fillRef idx="0">
+            <a:schemeClr val="accent1"/>
+          </a:fillRef>
+          <a:effectRef idx="0">
+            <a:schemeClr val="accent1"/>
+          </a:effectRef>
+          <a:fontRef idx="minor">
+            <a:schemeClr val="tx1"/>
+          </a:fontRef>
+        </p:style>
+      </p:cxnSp>
+      <p:sp>
+        <p:nvSpPr>
+          <p:cNvPr id="24" name="ZoneTexte 23"/>
+          <p:cNvSpPr txBox="1"/>
+          <p:nvPr/>
+        </p:nvSpPr>
+        <p:spPr>
+          <a:xfrm>
+            <a:off x="3527570" y="5488026"/>
+            <a:ext cx="7275711" cy="316231"/>
+          </a:xfrm>
+          <a:prstGeom prst="rect">
+            <a:avLst/>
+          </a:prstGeom>
+          <a:noFill/>
+        </p:spPr>
+        <p:txBody>
+          <a:bodyPr wrap="square" rtlCol="0">
+            <a:noAutofit/>
+          </a:bodyPr>
+          <a:lstStyle/>
+          <a:p>
+            <a:r>
+              <a:rPr lang="fr-FR" sz="1100" dirty="0"/>
+              <a:t>Ce bouton qui permet de passer à l’étape suivante réalise avant d’envoyer la requête au serveur tous les contrôles minimum requis, à savoir qu’il faut avoir sélectionné au moins un billet/tarif, et qu’il faut que le champ date ne soit pas déjà passé ou ne soit ni un samedi, ni un dimanche. Si ces condition</a:t>
+            </a:r>
+          </a:p>
+        </p:txBody>
+      </p:sp>
+      <p:pic>
+        <p:nvPicPr>
+          <p:cNvPr id="25" name="Image 24"/>
+          <p:cNvPicPr/>
+          <p:nvPr/>
+        </p:nvPicPr>
+        <p:blipFill>
+          <a:blip r:embed="rId5"/>
+          <a:stretch>
+            <a:fillRect/>
+          </a:stretch>
+        </p:blipFill>
+        <p:spPr>
+          <a:xfrm>
+            <a:off x="6481823" y="55943"/>
+            <a:ext cx="5629312" cy="1054400"/>
+          </a:xfrm>
+          <a:prstGeom prst="rect">
+            <a:avLst/>
+          </a:prstGeom>
+        </p:spPr>
+      </p:pic>
+      <p:sp>
+        <p:nvSpPr>
+          <p:cNvPr id="26" name="Rectangle à coins arrondis 25"/>
+          <p:cNvSpPr/>
+          <p:nvPr/>
+        </p:nvSpPr>
+        <p:spPr>
+          <a:xfrm>
+            <a:off x="7063273" y="587829"/>
+            <a:ext cx="877078" cy="457200"/>
+          </a:xfrm>
+          <a:prstGeom prst="roundRect">
+            <a:avLst/>
+          </a:prstGeom>
+          <a:noFill/>
+          <a:ln w="28575">
+            <a:solidFill>
+              <a:schemeClr val="tx1"/>
+            </a:solidFill>
+          </a:ln>
+        </p:spPr>
+        <p:style>
+          <a:lnRef idx="2">
+            <a:schemeClr val="accent1">
+              <a:shade val="50000"/>
+            </a:schemeClr>
+          </a:lnRef>
+          <a:fillRef idx="1">
+            <a:schemeClr val="accent1"/>
+          </a:fillRef>
+          <a:effectRef idx="0">
+            <a:schemeClr val="accent1"/>
+          </a:effectRef>
+          <a:fontRef idx="minor">
+            <a:schemeClr val="lt1"/>
+          </a:fontRef>
+        </p:style>
+        <p:txBody>
+          <a:bodyPr rtlCol="0" anchor="ctr"/>
+          <a:lstStyle/>
+          <a:p>
+            <a:pPr algn="ctr"/>
+            <a:endParaRPr lang="fr-FR"/>
+          </a:p>
+        </p:txBody>
+      </p:sp>
     </p:spTree>
     <p:extLst>
       <p:ext uri="{BB962C8B-B14F-4D97-AF65-F5344CB8AC3E}">
         <p14:creationId xmlns:p14="http://schemas.microsoft.com/office/powerpoint/2010/main" val="1636154237"/>
+      </p:ext>
+    </p:extLst>
+  </p:cSld>
+  <p:clrMapOvr>
+    <a:masterClrMapping/>
+  </p:clrMapOvr>
+</p:sld>
+</file>
+
+<file path=ppt/slides/slide5.xml><?xml version="1.0" encoding="utf-8"?>
+<p:sld xmlns:a="http://schemas.openxmlformats.org/drawingml/2006/main" xmlns:r="http://schemas.openxmlformats.org/officeDocument/2006/relationships" xmlns:p="http://schemas.openxmlformats.org/presentationml/2006/main">
+  <p:cSld>
+    <p:spTree>
+      <p:nvGrpSpPr>
+        <p:cNvPr id="1" name=""/>
+        <p:cNvGrpSpPr/>
+        <p:nvPr/>
+      </p:nvGrpSpPr>
+      <p:grpSpPr>
+        <a:xfrm>
+          <a:off x="0" y="0"/>
+          <a:ext cx="0" cy="0"/>
+          <a:chOff x="0" y="0"/>
+          <a:chExt cx="0" cy="0"/>
+        </a:xfrm>
+      </p:grpSpPr>
+      <p:sp>
+        <p:nvSpPr>
+          <p:cNvPr id="2" name="Titre 1"/>
+          <p:cNvSpPr>
+            <a:spLocks noGrp="1"/>
+          </p:cNvSpPr>
+          <p:nvPr>
+            <p:ph type="title"/>
+          </p:nvPr>
+        </p:nvSpPr>
+        <p:spPr/>
+        <p:txBody>
+          <a:bodyPr/>
+          <a:lstStyle/>
+          <a:p>
+            <a:r>
+              <a:rPr lang="fr-FR" dirty="0"/>
+              <a:t>E2: Détails billets</a:t>
+            </a:r>
+          </a:p>
+        </p:txBody>
+      </p:sp>
+      <p:pic>
+        <p:nvPicPr>
+          <p:cNvPr id="4" name="Image 3"/>
+          <p:cNvPicPr>
+            <a:picLocks noChangeAspect="1"/>
+          </p:cNvPicPr>
+          <p:nvPr/>
+        </p:nvPicPr>
+        <p:blipFill>
+          <a:blip r:embed="rId2"/>
+          <a:stretch>
+            <a:fillRect/>
+          </a:stretch>
+        </p:blipFill>
+        <p:spPr>
+          <a:xfrm>
+            <a:off x="99234" y="1737360"/>
+            <a:ext cx="7496175" cy="4029075"/>
+          </a:xfrm>
+          <a:prstGeom prst="rect">
+            <a:avLst/>
+          </a:prstGeom>
+        </p:spPr>
+      </p:pic>
+      <p:sp>
+        <p:nvSpPr>
+          <p:cNvPr id="5" name="Accolade fermante 4"/>
+          <p:cNvSpPr/>
+          <p:nvPr/>
+        </p:nvSpPr>
+        <p:spPr>
+          <a:xfrm>
+            <a:off x="7651102" y="1737360"/>
+            <a:ext cx="242596" cy="791236"/>
+          </a:xfrm>
+          <a:prstGeom prst="rightBrace">
+            <a:avLst/>
+          </a:prstGeom>
+          <a:ln>
+            <a:solidFill>
+              <a:srgbClr val="FF0000"/>
+            </a:solidFill>
+          </a:ln>
+        </p:spPr>
+        <p:style>
+          <a:lnRef idx="1">
+            <a:schemeClr val="accent1"/>
+          </a:lnRef>
+          <a:fillRef idx="0">
+            <a:schemeClr val="accent1"/>
+          </a:fillRef>
+          <a:effectRef idx="0">
+            <a:schemeClr val="accent1"/>
+          </a:effectRef>
+          <a:fontRef idx="minor">
+            <a:schemeClr val="tx1"/>
+          </a:fontRef>
+        </p:style>
+        <p:txBody>
+          <a:bodyPr rtlCol="0" anchor="ctr"/>
+          <a:lstStyle/>
+          <a:p>
+            <a:pPr algn="ctr"/>
+            <a:endParaRPr lang="fr-FR"/>
+          </a:p>
+        </p:txBody>
+      </p:sp>
+      <p:sp>
+        <p:nvSpPr>
+          <p:cNvPr id="6" name="ZoneTexte 5"/>
+          <p:cNvSpPr txBox="1"/>
+          <p:nvPr/>
+        </p:nvSpPr>
+        <p:spPr>
+          <a:xfrm>
+            <a:off x="7893697" y="1933559"/>
+            <a:ext cx="4117069" cy="595037"/>
+          </a:xfrm>
+          <a:prstGeom prst="rect">
+            <a:avLst/>
+          </a:prstGeom>
+          <a:noFill/>
+        </p:spPr>
+        <p:txBody>
+          <a:bodyPr wrap="square" rtlCol="0">
+            <a:noAutofit/>
+          </a:bodyPr>
+          <a:lstStyle/>
+          <a:p>
+            <a:r>
+              <a:rPr lang="fr-FR" sz="1400" dirty="0"/>
+              <a:t>Zone invitant le visiteur à renseigner les données détaillés requis pour les billets.</a:t>
+            </a:r>
+          </a:p>
+        </p:txBody>
+      </p:sp>
+      <p:sp>
+        <p:nvSpPr>
+          <p:cNvPr id="7" name="ZoneTexte 6"/>
+          <p:cNvSpPr txBox="1"/>
+          <p:nvPr/>
+        </p:nvSpPr>
+        <p:spPr>
+          <a:xfrm>
+            <a:off x="5835162" y="1044223"/>
+            <a:ext cx="6084989" cy="595037"/>
+          </a:xfrm>
+          <a:prstGeom prst="rect">
+            <a:avLst/>
+          </a:prstGeom>
+          <a:noFill/>
+        </p:spPr>
+        <p:txBody>
+          <a:bodyPr wrap="square" rtlCol="0">
+            <a:noAutofit/>
+          </a:bodyPr>
+          <a:lstStyle/>
+          <a:p>
+            <a:r>
+              <a:rPr lang="fr-FR" sz="1400" dirty="0"/>
+              <a:t>Cette page est sécurisée https afin de s’assurer que les informations renseignées dans ce formulaire ne sont pas ‘espionnées’.</a:t>
+            </a:r>
+          </a:p>
+        </p:txBody>
+      </p:sp>
+      <p:sp>
+        <p:nvSpPr>
+          <p:cNvPr id="8" name="Accolade fermante 7"/>
+          <p:cNvSpPr/>
+          <p:nvPr/>
+        </p:nvSpPr>
+        <p:spPr>
+          <a:xfrm>
+            <a:off x="7636474" y="2626695"/>
+            <a:ext cx="242596" cy="1393369"/>
+          </a:xfrm>
+          <a:prstGeom prst="rightBrace">
+            <a:avLst/>
+          </a:prstGeom>
+          <a:ln>
+            <a:solidFill>
+              <a:srgbClr val="FF0000"/>
+            </a:solidFill>
+          </a:ln>
+        </p:spPr>
+        <p:style>
+          <a:lnRef idx="1">
+            <a:schemeClr val="accent1"/>
+          </a:lnRef>
+          <a:fillRef idx="0">
+            <a:schemeClr val="accent1"/>
+          </a:fillRef>
+          <a:effectRef idx="0">
+            <a:schemeClr val="accent1"/>
+          </a:effectRef>
+          <a:fontRef idx="minor">
+            <a:schemeClr val="tx1"/>
+          </a:fontRef>
+        </p:style>
+        <p:txBody>
+          <a:bodyPr rtlCol="0" anchor="ctr"/>
+          <a:lstStyle/>
+          <a:p>
+            <a:pPr algn="ctr"/>
+            <a:endParaRPr lang="fr-FR"/>
+          </a:p>
+        </p:txBody>
+      </p:sp>
+      <p:sp>
+        <p:nvSpPr>
+          <p:cNvPr id="9" name="ZoneTexte 8"/>
+          <p:cNvSpPr txBox="1"/>
+          <p:nvPr/>
+        </p:nvSpPr>
+        <p:spPr>
+          <a:xfrm>
+            <a:off x="7920135" y="2777770"/>
+            <a:ext cx="4117069" cy="1019874"/>
+          </a:xfrm>
+          <a:prstGeom prst="rect">
+            <a:avLst/>
+          </a:prstGeom>
+          <a:noFill/>
+        </p:spPr>
+        <p:txBody>
+          <a:bodyPr wrap="square" rtlCol="0">
+            <a:noAutofit/>
+          </a:bodyPr>
+          <a:lstStyle/>
+          <a:p>
+            <a:r>
+              <a:rPr lang="fr-FR" sz="1400" dirty="0"/>
+              <a:t>Zone interactive sous forme d’accordéon groupé selon les différents tarifs sélectionnés, permet au visiteur de renseigner les données complémentaires liées aux billets</a:t>
+            </a:r>
+          </a:p>
+        </p:txBody>
+      </p:sp>
+      <p:sp>
+        <p:nvSpPr>
+          <p:cNvPr id="10" name="Accolade fermante 9"/>
+          <p:cNvSpPr/>
+          <p:nvPr/>
+        </p:nvSpPr>
+        <p:spPr>
+          <a:xfrm>
+            <a:off x="7651102" y="4117742"/>
+            <a:ext cx="242596" cy="478972"/>
+          </a:xfrm>
+          <a:prstGeom prst="rightBrace">
+            <a:avLst/>
+          </a:prstGeom>
+          <a:ln>
+            <a:solidFill>
+              <a:srgbClr val="FF0000"/>
+            </a:solidFill>
+          </a:ln>
+        </p:spPr>
+        <p:style>
+          <a:lnRef idx="1">
+            <a:schemeClr val="accent1"/>
+          </a:lnRef>
+          <a:fillRef idx="0">
+            <a:schemeClr val="accent1"/>
+          </a:fillRef>
+          <a:effectRef idx="0">
+            <a:schemeClr val="accent1"/>
+          </a:effectRef>
+          <a:fontRef idx="minor">
+            <a:schemeClr val="tx1"/>
+          </a:fontRef>
+        </p:style>
+        <p:txBody>
+          <a:bodyPr rtlCol="0" anchor="ctr"/>
+          <a:lstStyle/>
+          <a:p>
+            <a:pPr algn="ctr"/>
+            <a:endParaRPr lang="fr-FR"/>
+          </a:p>
+        </p:txBody>
+      </p:sp>
+      <p:sp>
+        <p:nvSpPr>
+          <p:cNvPr id="11" name="ZoneTexte 10"/>
+          <p:cNvSpPr txBox="1"/>
+          <p:nvPr/>
+        </p:nvSpPr>
+        <p:spPr>
+          <a:xfrm>
+            <a:off x="7920135" y="4020064"/>
+            <a:ext cx="4117069" cy="576650"/>
+          </a:xfrm>
+          <a:prstGeom prst="rect">
+            <a:avLst/>
+          </a:prstGeom>
+          <a:noFill/>
+        </p:spPr>
+        <p:txBody>
+          <a:bodyPr wrap="square" rtlCol="0">
+            <a:noAutofit/>
+          </a:bodyPr>
+          <a:lstStyle/>
+          <a:p>
+            <a:r>
+              <a:rPr lang="fr-FR" sz="1400" dirty="0"/>
+              <a:t>Zone formulaire pour récupérer les informations liées à l’acheteur.</a:t>
+            </a:r>
+          </a:p>
+        </p:txBody>
+      </p:sp>
+      <p:sp>
+        <p:nvSpPr>
+          <p:cNvPr id="12" name="Accolade fermante 11"/>
+          <p:cNvSpPr/>
+          <p:nvPr/>
+        </p:nvSpPr>
+        <p:spPr>
+          <a:xfrm>
+            <a:off x="7672874" y="4694392"/>
+            <a:ext cx="242596" cy="989716"/>
+          </a:xfrm>
+          <a:prstGeom prst="rightBrace">
+            <a:avLst/>
+          </a:prstGeom>
+          <a:ln>
+            <a:solidFill>
+              <a:srgbClr val="FF0000"/>
+            </a:solidFill>
+          </a:ln>
+        </p:spPr>
+        <p:style>
+          <a:lnRef idx="1">
+            <a:schemeClr val="accent1"/>
+          </a:lnRef>
+          <a:fillRef idx="0">
+            <a:schemeClr val="accent1"/>
+          </a:fillRef>
+          <a:effectRef idx="0">
+            <a:schemeClr val="accent1"/>
+          </a:effectRef>
+          <a:fontRef idx="minor">
+            <a:schemeClr val="tx1"/>
+          </a:fontRef>
+        </p:style>
+        <p:txBody>
+          <a:bodyPr rtlCol="0" anchor="ctr"/>
+          <a:lstStyle/>
+          <a:p>
+            <a:pPr algn="ctr"/>
+            <a:endParaRPr lang="fr-FR"/>
+          </a:p>
+        </p:txBody>
+      </p:sp>
+      <p:sp>
+        <p:nvSpPr>
+          <p:cNvPr id="13" name="ZoneTexte 12"/>
+          <p:cNvSpPr txBox="1"/>
+          <p:nvPr/>
+        </p:nvSpPr>
+        <p:spPr>
+          <a:xfrm>
+            <a:off x="7879070" y="4504918"/>
+            <a:ext cx="4117069" cy="576650"/>
+          </a:xfrm>
+          <a:prstGeom prst="rect">
+            <a:avLst/>
+          </a:prstGeom>
+          <a:noFill/>
+        </p:spPr>
+        <p:txBody>
+          <a:bodyPr wrap="square" rtlCol="0">
+            <a:noAutofit/>
+          </a:bodyPr>
+          <a:lstStyle/>
+          <a:p>
+            <a:r>
+              <a:rPr lang="fr-FR" sz="1400" dirty="0"/>
+              <a:t>Boutons d’interaction retour/suivant permettant à l’utilisateur soit de retourner à l’écran précédent (flèche gauche), soit de soumettre ces données (flèche droite).</a:t>
+            </a:r>
+          </a:p>
+          <a:p>
+            <a:r>
+              <a:rPr lang="fr-FR" sz="1400" dirty="0"/>
+              <a:t>En cas de soumission des données (flèche droite) l’ensemble des valeurs renseignées sont testées et si les critères ne sont pas respectés les messages d’erreur sont remontés à l’utilisateur, sinon on passe à l’étape 3.</a:t>
+            </a:r>
+          </a:p>
+        </p:txBody>
+      </p:sp>
+      <p:pic>
+        <p:nvPicPr>
+          <p:cNvPr id="14" name="Image 13"/>
+          <p:cNvPicPr/>
+          <p:nvPr/>
+        </p:nvPicPr>
+        <p:blipFill>
+          <a:blip r:embed="rId3"/>
+          <a:stretch>
+            <a:fillRect/>
+          </a:stretch>
+        </p:blipFill>
+        <p:spPr>
+          <a:xfrm>
+            <a:off x="6456942" y="27486"/>
+            <a:ext cx="5629312" cy="1054400"/>
+          </a:xfrm>
+          <a:prstGeom prst="rect">
+            <a:avLst/>
+          </a:prstGeom>
+        </p:spPr>
+      </p:pic>
+      <p:sp>
+        <p:nvSpPr>
+          <p:cNvPr id="15" name="Rectangle à coins arrondis 14"/>
+          <p:cNvSpPr/>
+          <p:nvPr/>
+        </p:nvSpPr>
+        <p:spPr>
+          <a:xfrm>
+            <a:off x="8204718" y="563549"/>
+            <a:ext cx="877078" cy="457200"/>
+          </a:xfrm>
+          <a:prstGeom prst="roundRect">
+            <a:avLst/>
+          </a:prstGeom>
+          <a:noFill/>
+          <a:ln w="28575">
+            <a:solidFill>
+              <a:schemeClr val="tx1"/>
+            </a:solidFill>
+          </a:ln>
+        </p:spPr>
+        <p:style>
+          <a:lnRef idx="2">
+            <a:schemeClr val="accent1">
+              <a:shade val="50000"/>
+            </a:schemeClr>
+          </a:lnRef>
+          <a:fillRef idx="1">
+            <a:schemeClr val="accent1"/>
+          </a:fillRef>
+          <a:effectRef idx="0">
+            <a:schemeClr val="accent1"/>
+          </a:effectRef>
+          <a:fontRef idx="minor">
+            <a:schemeClr val="lt1"/>
+          </a:fontRef>
+        </p:style>
+        <p:txBody>
+          <a:bodyPr rtlCol="0" anchor="ctr"/>
+          <a:lstStyle/>
+          <a:p>
+            <a:pPr algn="ctr"/>
+            <a:endParaRPr lang="fr-FR"/>
+          </a:p>
+        </p:txBody>
+      </p:sp>
+    </p:spTree>
+    <p:extLst>
+      <p:ext uri="{BB962C8B-B14F-4D97-AF65-F5344CB8AC3E}">
+        <p14:creationId xmlns:p14="http://schemas.microsoft.com/office/powerpoint/2010/main" val="2500392463"/>
+      </p:ext>
+    </p:extLst>
+  </p:cSld>
+  <p:clrMapOvr>
+    <a:masterClrMapping/>
+  </p:clrMapOvr>
+</p:sld>
+</file>
+
+<file path=ppt/slides/slide6.xml><?xml version="1.0" encoding="utf-8"?>
+<p:sld xmlns:a="http://schemas.openxmlformats.org/drawingml/2006/main" xmlns:r="http://schemas.openxmlformats.org/officeDocument/2006/relationships" xmlns:p="http://schemas.openxmlformats.org/presentationml/2006/main">
+  <p:cSld>
+    <p:spTree>
+      <p:nvGrpSpPr>
+        <p:cNvPr id="1" name=""/>
+        <p:cNvGrpSpPr/>
+        <p:nvPr/>
+      </p:nvGrpSpPr>
+      <p:grpSpPr>
+        <a:xfrm>
+          <a:off x="0" y="0"/>
+          <a:ext cx="0" cy="0"/>
+          <a:chOff x="0" y="0"/>
+          <a:chExt cx="0" cy="0"/>
+        </a:xfrm>
+      </p:grpSpPr>
+      <p:sp>
+        <p:nvSpPr>
+          <p:cNvPr id="2" name="Titre 1"/>
+          <p:cNvSpPr>
+            <a:spLocks noGrp="1"/>
+          </p:cNvSpPr>
+          <p:nvPr>
+            <p:ph type="title"/>
+          </p:nvPr>
+        </p:nvSpPr>
+        <p:spPr/>
+        <p:txBody>
+          <a:bodyPr/>
+          <a:lstStyle/>
+          <a:p>
+            <a:r>
+              <a:rPr lang="fr-FR" dirty="0"/>
+              <a:t>E3: Mode de paiement</a:t>
+            </a:r>
+          </a:p>
+        </p:txBody>
+      </p:sp>
+      <p:pic>
+        <p:nvPicPr>
+          <p:cNvPr id="4" name="Image 3"/>
+          <p:cNvPicPr>
+            <a:picLocks noChangeAspect="1"/>
+          </p:cNvPicPr>
+          <p:nvPr/>
+        </p:nvPicPr>
+        <p:blipFill>
+          <a:blip r:embed="rId2"/>
+          <a:stretch>
+            <a:fillRect/>
+          </a:stretch>
+        </p:blipFill>
+        <p:spPr>
+          <a:xfrm>
+            <a:off x="131114" y="2221949"/>
+            <a:ext cx="6988143" cy="3075446"/>
+          </a:xfrm>
+          <a:prstGeom prst="rect">
+            <a:avLst/>
+          </a:prstGeom>
+        </p:spPr>
+      </p:pic>
+      <p:sp>
+        <p:nvSpPr>
+          <p:cNvPr id="5" name="Accolade fermante 4"/>
+          <p:cNvSpPr/>
+          <p:nvPr/>
+        </p:nvSpPr>
+        <p:spPr>
+          <a:xfrm>
+            <a:off x="7119257" y="2221948"/>
+            <a:ext cx="242596" cy="455349"/>
+          </a:xfrm>
+          <a:prstGeom prst="rightBrace">
+            <a:avLst/>
+          </a:prstGeom>
+          <a:ln>
+            <a:solidFill>
+              <a:srgbClr val="FF0000"/>
+            </a:solidFill>
+          </a:ln>
+        </p:spPr>
+        <p:style>
+          <a:lnRef idx="1">
+            <a:schemeClr val="accent1"/>
+          </a:lnRef>
+          <a:fillRef idx="0">
+            <a:schemeClr val="accent1"/>
+          </a:fillRef>
+          <a:effectRef idx="0">
+            <a:schemeClr val="accent1"/>
+          </a:effectRef>
+          <a:fontRef idx="minor">
+            <a:schemeClr val="tx1"/>
+          </a:fontRef>
+        </p:style>
+        <p:txBody>
+          <a:bodyPr rtlCol="0" anchor="ctr"/>
+          <a:lstStyle/>
+          <a:p>
+            <a:pPr algn="ctr"/>
+            <a:endParaRPr lang="fr-FR"/>
+          </a:p>
+        </p:txBody>
+      </p:sp>
+      <p:sp>
+        <p:nvSpPr>
+          <p:cNvPr id="6" name="ZoneTexte 5"/>
+          <p:cNvSpPr txBox="1"/>
+          <p:nvPr/>
+        </p:nvSpPr>
+        <p:spPr>
+          <a:xfrm>
+            <a:off x="7361853" y="2221947"/>
+            <a:ext cx="4117069" cy="595037"/>
+          </a:xfrm>
+          <a:prstGeom prst="rect">
+            <a:avLst/>
+          </a:prstGeom>
+          <a:noFill/>
+        </p:spPr>
+        <p:txBody>
+          <a:bodyPr wrap="square" rtlCol="0">
+            <a:noAutofit/>
+          </a:bodyPr>
+          <a:lstStyle/>
+          <a:p>
+            <a:r>
+              <a:rPr lang="fr-FR" sz="1400" dirty="0"/>
+              <a:t>Zone invitant le visiteur à choisir son moyen de paiement.</a:t>
+            </a:r>
+          </a:p>
+        </p:txBody>
+      </p:sp>
+      <p:sp>
+        <p:nvSpPr>
+          <p:cNvPr id="7" name="Accolade fermante 6"/>
+          <p:cNvSpPr/>
+          <p:nvPr/>
+        </p:nvSpPr>
+        <p:spPr>
+          <a:xfrm>
+            <a:off x="7119257" y="2706536"/>
+            <a:ext cx="242596" cy="1750134"/>
+          </a:xfrm>
+          <a:prstGeom prst="rightBrace">
+            <a:avLst/>
+          </a:prstGeom>
+          <a:ln>
+            <a:solidFill>
+              <a:srgbClr val="FF0000"/>
+            </a:solidFill>
+          </a:ln>
+        </p:spPr>
+        <p:style>
+          <a:lnRef idx="1">
+            <a:schemeClr val="accent1"/>
+          </a:lnRef>
+          <a:fillRef idx="0">
+            <a:schemeClr val="accent1"/>
+          </a:fillRef>
+          <a:effectRef idx="0">
+            <a:schemeClr val="accent1"/>
+          </a:effectRef>
+          <a:fontRef idx="minor">
+            <a:schemeClr val="tx1"/>
+          </a:fontRef>
+        </p:style>
+        <p:txBody>
+          <a:bodyPr rtlCol="0" anchor="ctr"/>
+          <a:lstStyle/>
+          <a:p>
+            <a:pPr algn="ctr"/>
+            <a:endParaRPr lang="fr-FR"/>
+          </a:p>
+        </p:txBody>
+      </p:sp>
+      <p:sp>
+        <p:nvSpPr>
+          <p:cNvPr id="8" name="ZoneTexte 7"/>
+          <p:cNvSpPr txBox="1"/>
+          <p:nvPr/>
+        </p:nvSpPr>
+        <p:spPr>
+          <a:xfrm>
+            <a:off x="7361852" y="3437712"/>
+            <a:ext cx="4117069" cy="398230"/>
+          </a:xfrm>
+          <a:prstGeom prst="rect">
+            <a:avLst/>
+          </a:prstGeom>
+          <a:noFill/>
+        </p:spPr>
+        <p:txBody>
+          <a:bodyPr wrap="square" rtlCol="0">
+            <a:noAutofit/>
+          </a:bodyPr>
+          <a:lstStyle/>
+          <a:p>
+            <a:r>
+              <a:rPr lang="fr-FR" sz="1400" dirty="0"/>
+              <a:t>Zone récapitulative de la commande.</a:t>
+            </a:r>
+          </a:p>
+        </p:txBody>
+      </p:sp>
+      <p:sp>
+        <p:nvSpPr>
+          <p:cNvPr id="9" name="Rectangle 8"/>
+          <p:cNvSpPr/>
+          <p:nvPr/>
+        </p:nvSpPr>
+        <p:spPr>
+          <a:xfrm>
+            <a:off x="3459892" y="4514335"/>
+            <a:ext cx="3196281" cy="403653"/>
+          </a:xfrm>
+          <a:prstGeom prst="rect">
+            <a:avLst/>
+          </a:prstGeom>
+          <a:noFill/>
+          <a:ln>
+            <a:solidFill>
+              <a:srgbClr val="FF0000"/>
+            </a:solidFill>
+          </a:ln>
+        </p:spPr>
+        <p:style>
+          <a:lnRef idx="2">
+            <a:schemeClr val="accent1">
+              <a:shade val="50000"/>
+            </a:schemeClr>
+          </a:lnRef>
+          <a:fillRef idx="1">
+            <a:schemeClr val="accent1"/>
+          </a:fillRef>
+          <a:effectRef idx="0">
+            <a:schemeClr val="accent1"/>
+          </a:effectRef>
+          <a:fontRef idx="minor">
+            <a:schemeClr val="lt1"/>
+          </a:fontRef>
+        </p:style>
+        <p:txBody>
+          <a:bodyPr rtlCol="0" anchor="ctr"/>
+          <a:lstStyle/>
+          <a:p>
+            <a:pPr algn="ctr"/>
+            <a:endParaRPr lang="fr-FR"/>
+          </a:p>
+        </p:txBody>
+      </p:sp>
+      <p:sp>
+        <p:nvSpPr>
+          <p:cNvPr id="10" name="ZoneTexte 9"/>
+          <p:cNvSpPr txBox="1"/>
+          <p:nvPr/>
+        </p:nvSpPr>
+        <p:spPr>
+          <a:xfrm>
+            <a:off x="7361852" y="4567118"/>
+            <a:ext cx="4117069" cy="398230"/>
+          </a:xfrm>
+          <a:prstGeom prst="rect">
+            <a:avLst/>
+          </a:prstGeom>
+          <a:noFill/>
+        </p:spPr>
+        <p:txBody>
+          <a:bodyPr wrap="square" rtlCol="0">
+            <a:noAutofit/>
+          </a:bodyPr>
+          <a:lstStyle/>
+          <a:p>
+            <a:r>
+              <a:rPr lang="fr-FR" sz="1400" dirty="0"/>
+              <a:t>Boutons de choix du mode de paiement.</a:t>
+            </a:r>
+          </a:p>
+        </p:txBody>
+      </p:sp>
+      <p:cxnSp>
+        <p:nvCxnSpPr>
+          <p:cNvPr id="12" name="Connecteur droit avec flèche 11"/>
+          <p:cNvCxnSpPr>
+            <a:stCxn id="9" idx="3"/>
+          </p:cNvCxnSpPr>
+          <p:nvPr/>
+        </p:nvCxnSpPr>
+        <p:spPr>
+          <a:xfrm flipV="1">
+            <a:off x="6656173" y="4716161"/>
+            <a:ext cx="584382" cy="1"/>
+          </a:xfrm>
+          <a:prstGeom prst="straightConnector1">
+            <a:avLst/>
+          </a:prstGeom>
+          <a:ln>
+            <a:solidFill>
+              <a:srgbClr val="FF0000"/>
+            </a:solidFill>
+            <a:tailEnd type="triangle"/>
+          </a:ln>
+        </p:spPr>
+        <p:style>
+          <a:lnRef idx="1">
+            <a:schemeClr val="accent1"/>
+          </a:lnRef>
+          <a:fillRef idx="0">
+            <a:schemeClr val="accent1"/>
+          </a:fillRef>
+          <a:effectRef idx="0">
+            <a:schemeClr val="accent1"/>
+          </a:effectRef>
+          <a:fontRef idx="minor">
+            <a:schemeClr val="tx1"/>
+          </a:fontRef>
+        </p:style>
+      </p:cxnSp>
+      <p:pic>
+        <p:nvPicPr>
+          <p:cNvPr id="13" name="Image 12"/>
+          <p:cNvPicPr>
+            <a:picLocks noChangeAspect="1"/>
+          </p:cNvPicPr>
+          <p:nvPr/>
+        </p:nvPicPr>
+        <p:blipFill>
+          <a:blip r:embed="rId3"/>
+          <a:stretch>
+            <a:fillRect/>
+          </a:stretch>
+        </p:blipFill>
+        <p:spPr>
+          <a:xfrm>
+            <a:off x="3751993" y="5398995"/>
+            <a:ext cx="883508" cy="1272251"/>
+          </a:xfrm>
+          <a:prstGeom prst="rect">
+            <a:avLst/>
+          </a:prstGeom>
+        </p:spPr>
+      </p:pic>
+      <p:sp>
+        <p:nvSpPr>
+          <p:cNvPr id="14" name="Flèche vers le bas 13"/>
+          <p:cNvSpPr/>
+          <p:nvPr/>
+        </p:nvSpPr>
+        <p:spPr>
+          <a:xfrm>
+            <a:off x="3924300" y="4826000"/>
+            <a:ext cx="469900" cy="571500"/>
+          </a:xfrm>
+          <a:prstGeom prst="downArrow">
+            <a:avLst/>
+          </a:prstGeom>
+        </p:spPr>
+        <p:style>
+          <a:lnRef idx="2">
+            <a:schemeClr val="accent1">
+              <a:shade val="50000"/>
+            </a:schemeClr>
+          </a:lnRef>
+          <a:fillRef idx="1">
+            <a:schemeClr val="accent1"/>
+          </a:fillRef>
+          <a:effectRef idx="0">
+            <a:schemeClr val="accent1"/>
+          </a:effectRef>
+          <a:fontRef idx="minor">
+            <a:schemeClr val="lt1"/>
+          </a:fontRef>
+        </p:style>
+        <p:txBody>
+          <a:bodyPr rtlCol="0" anchor="ctr"/>
+          <a:lstStyle/>
+          <a:p>
+            <a:pPr algn="ctr"/>
+            <a:endParaRPr lang="fr-FR"/>
+          </a:p>
+        </p:txBody>
+      </p:sp>
+      <p:sp>
+        <p:nvSpPr>
+          <p:cNvPr id="15" name="Virage 14"/>
+          <p:cNvSpPr/>
+          <p:nvPr/>
+        </p:nvSpPr>
+        <p:spPr>
+          <a:xfrm flipV="1">
+            <a:off x="5741773" y="5297395"/>
+            <a:ext cx="1377484" cy="707989"/>
+          </a:xfrm>
+          <a:prstGeom prst="bentArrow">
+            <a:avLst/>
+          </a:prstGeom>
+        </p:spPr>
+        <p:style>
+          <a:lnRef idx="2">
+            <a:schemeClr val="accent1">
+              <a:shade val="50000"/>
+            </a:schemeClr>
+          </a:lnRef>
+          <a:fillRef idx="1">
+            <a:schemeClr val="accent1"/>
+          </a:fillRef>
+          <a:effectRef idx="0">
+            <a:schemeClr val="accent1"/>
+          </a:effectRef>
+          <a:fontRef idx="minor">
+            <a:schemeClr val="lt1"/>
+          </a:fontRef>
+        </p:style>
+        <p:txBody>
+          <a:bodyPr rtlCol="0" anchor="ctr"/>
+          <a:lstStyle/>
+          <a:p>
+            <a:pPr algn="ctr"/>
+            <a:endParaRPr lang="fr-FR" dirty="0">
+              <a:solidFill>
+                <a:schemeClr val="tx1"/>
+              </a:solidFill>
+            </a:endParaRPr>
+          </a:p>
+        </p:txBody>
+      </p:sp>
+      <p:pic>
+        <p:nvPicPr>
+          <p:cNvPr id="16" name="Image 15"/>
+          <p:cNvPicPr>
+            <a:picLocks noChangeAspect="1"/>
+          </p:cNvPicPr>
+          <p:nvPr/>
+        </p:nvPicPr>
+        <p:blipFill>
+          <a:blip r:embed="rId4"/>
+          <a:stretch>
+            <a:fillRect/>
+          </a:stretch>
+        </p:blipFill>
+        <p:spPr>
+          <a:xfrm>
+            <a:off x="7119257" y="5088753"/>
+            <a:ext cx="2399608" cy="1286856"/>
+          </a:xfrm>
+          <a:prstGeom prst="rect">
+            <a:avLst/>
+          </a:prstGeom>
+          <a:ln>
+            <a:solidFill>
+              <a:schemeClr val="tx1"/>
+            </a:solidFill>
+          </a:ln>
+        </p:spPr>
+      </p:pic>
+      <p:sp>
+        <p:nvSpPr>
+          <p:cNvPr id="17" name="ZoneTexte 16"/>
+          <p:cNvSpPr txBox="1"/>
+          <p:nvPr/>
+        </p:nvSpPr>
+        <p:spPr>
+          <a:xfrm>
+            <a:off x="5983074" y="5632837"/>
+            <a:ext cx="847091" cy="369332"/>
+          </a:xfrm>
+          <a:prstGeom prst="rect">
+            <a:avLst/>
+          </a:prstGeom>
+          <a:noFill/>
+        </p:spPr>
+        <p:txBody>
+          <a:bodyPr wrap="none" rtlCol="0">
+            <a:spAutoFit/>
+          </a:bodyPr>
+          <a:lstStyle/>
+          <a:p>
+            <a:r>
+              <a:rPr lang="fr-FR" dirty="0"/>
+              <a:t>PAYPAL</a:t>
+            </a:r>
+          </a:p>
+        </p:txBody>
+      </p:sp>
+      <p:sp>
+        <p:nvSpPr>
+          <p:cNvPr id="18" name="ZoneTexte 17"/>
+          <p:cNvSpPr txBox="1"/>
+          <p:nvPr/>
+        </p:nvSpPr>
+        <p:spPr>
+          <a:xfrm>
+            <a:off x="2937346" y="5632837"/>
+            <a:ext cx="814647" cy="369332"/>
+          </a:xfrm>
+          <a:prstGeom prst="rect">
+            <a:avLst/>
+          </a:prstGeom>
+          <a:noFill/>
+        </p:spPr>
+        <p:txBody>
+          <a:bodyPr wrap="none" rtlCol="0">
+            <a:spAutoFit/>
+          </a:bodyPr>
+          <a:lstStyle/>
+          <a:p>
+            <a:r>
+              <a:rPr lang="fr-FR" dirty="0"/>
+              <a:t>STRIPE</a:t>
+            </a:r>
+          </a:p>
+        </p:txBody>
+      </p:sp>
+      <p:sp>
+        <p:nvSpPr>
+          <p:cNvPr id="19" name="ZoneTexte 18"/>
+          <p:cNvSpPr txBox="1"/>
+          <p:nvPr/>
+        </p:nvSpPr>
+        <p:spPr>
+          <a:xfrm>
+            <a:off x="6944497" y="914401"/>
+            <a:ext cx="4975654" cy="724860"/>
+          </a:xfrm>
+          <a:prstGeom prst="rect">
+            <a:avLst/>
+          </a:prstGeom>
+          <a:noFill/>
+        </p:spPr>
+        <p:txBody>
+          <a:bodyPr wrap="square" rtlCol="0">
+            <a:noAutofit/>
+          </a:bodyPr>
+          <a:lstStyle/>
+          <a:p>
+            <a:r>
+              <a:rPr lang="fr-FR" sz="1400" dirty="0"/>
+              <a:t>Cette page est sécurisée https afin de s’assurer que les informations renseignées dans ce formulaire ne sont pas ‘espionnées’.</a:t>
+            </a:r>
+          </a:p>
+        </p:txBody>
+      </p:sp>
+      <p:pic>
+        <p:nvPicPr>
+          <p:cNvPr id="20" name="Image 19"/>
+          <p:cNvPicPr/>
+          <p:nvPr/>
+        </p:nvPicPr>
+        <p:blipFill>
+          <a:blip r:embed="rId5"/>
+          <a:stretch>
+            <a:fillRect/>
+          </a:stretch>
+        </p:blipFill>
+        <p:spPr>
+          <a:xfrm>
+            <a:off x="6481823" y="55943"/>
+            <a:ext cx="5629312" cy="1054400"/>
+          </a:xfrm>
+          <a:prstGeom prst="rect">
+            <a:avLst/>
+          </a:prstGeom>
+        </p:spPr>
+      </p:pic>
+      <p:sp>
+        <p:nvSpPr>
+          <p:cNvPr id="21" name="Rectangle à coins arrondis 20"/>
+          <p:cNvSpPr/>
+          <p:nvPr/>
+        </p:nvSpPr>
+        <p:spPr>
+          <a:xfrm>
+            <a:off x="9432324" y="587702"/>
+            <a:ext cx="877078" cy="457200"/>
+          </a:xfrm>
+          <a:prstGeom prst="roundRect">
+            <a:avLst/>
+          </a:prstGeom>
+          <a:noFill/>
+          <a:ln w="28575">
+            <a:solidFill>
+              <a:schemeClr val="tx1"/>
+            </a:solidFill>
+          </a:ln>
+        </p:spPr>
+        <p:style>
+          <a:lnRef idx="2">
+            <a:schemeClr val="accent1">
+              <a:shade val="50000"/>
+            </a:schemeClr>
+          </a:lnRef>
+          <a:fillRef idx="1">
+            <a:schemeClr val="accent1"/>
+          </a:fillRef>
+          <a:effectRef idx="0">
+            <a:schemeClr val="accent1"/>
+          </a:effectRef>
+          <a:fontRef idx="minor">
+            <a:schemeClr val="lt1"/>
+          </a:fontRef>
+        </p:style>
+        <p:txBody>
+          <a:bodyPr rtlCol="0" anchor="ctr"/>
+          <a:lstStyle/>
+          <a:p>
+            <a:pPr algn="ctr"/>
+            <a:endParaRPr lang="fr-FR"/>
+          </a:p>
+        </p:txBody>
+      </p:sp>
+    </p:spTree>
+    <p:extLst>
+      <p:ext uri="{BB962C8B-B14F-4D97-AF65-F5344CB8AC3E}">
+        <p14:creationId xmlns:p14="http://schemas.microsoft.com/office/powerpoint/2010/main" val="4249025380"/>
+      </p:ext>
+    </p:extLst>
+  </p:cSld>
+  <p:clrMapOvr>
+    <a:masterClrMapping/>
+  </p:clrMapOvr>
+</p:sld>
+</file>
+
+<file path=ppt/slides/slide7.xml><?xml version="1.0" encoding="utf-8"?>
+<p:sld xmlns:a="http://schemas.openxmlformats.org/drawingml/2006/main" xmlns:r="http://schemas.openxmlformats.org/officeDocument/2006/relationships" xmlns:p="http://schemas.openxmlformats.org/presentationml/2006/main">
+  <p:cSld>
+    <p:spTree>
+      <p:nvGrpSpPr>
+        <p:cNvPr id="1" name=""/>
+        <p:cNvGrpSpPr/>
+        <p:nvPr/>
+      </p:nvGrpSpPr>
+      <p:grpSpPr>
+        <a:xfrm>
+          <a:off x="0" y="0"/>
+          <a:ext cx="0" cy="0"/>
+          <a:chOff x="0" y="0"/>
+          <a:chExt cx="0" cy="0"/>
+        </a:xfrm>
+      </p:grpSpPr>
+      <p:sp>
+        <p:nvSpPr>
+          <p:cNvPr id="2" name="Titre 1"/>
+          <p:cNvSpPr>
+            <a:spLocks noGrp="1"/>
+          </p:cNvSpPr>
+          <p:nvPr>
+            <p:ph type="title"/>
+          </p:nvPr>
+        </p:nvSpPr>
+        <p:spPr/>
+        <p:txBody>
+          <a:bodyPr/>
+          <a:lstStyle/>
+          <a:p>
+            <a:r>
+              <a:rPr lang="fr-FR" dirty="0"/>
+              <a:t>Enregistrement et envoie des billets</a:t>
+            </a:r>
+          </a:p>
+        </p:txBody>
+      </p:sp>
+      <p:sp>
+        <p:nvSpPr>
+          <p:cNvPr id="4" name="ZoneTexte 3"/>
+          <p:cNvSpPr txBox="1"/>
+          <p:nvPr/>
+        </p:nvSpPr>
+        <p:spPr>
+          <a:xfrm>
+            <a:off x="1097280" y="1927655"/>
+            <a:ext cx="9982612" cy="724860"/>
+          </a:xfrm>
+          <a:prstGeom prst="rect">
+            <a:avLst/>
+          </a:prstGeom>
+          <a:noFill/>
+        </p:spPr>
+        <p:txBody>
+          <a:bodyPr wrap="square" rtlCol="0">
+            <a:noAutofit/>
+          </a:bodyPr>
+          <a:lstStyle/>
+          <a:p>
+            <a:r>
+              <a:rPr lang="fr-FR" sz="1400" dirty="0"/>
+              <a:t>Si l’achat c’est bien passé et que l’utilisateur a payé par </a:t>
+            </a:r>
+            <a:r>
+              <a:rPr lang="fr-FR" sz="1400" dirty="0" err="1"/>
+              <a:t>Stripe</a:t>
+            </a:r>
+            <a:r>
+              <a:rPr lang="fr-FR" sz="1400" dirty="0"/>
+              <a:t> ou par </a:t>
+            </a:r>
+            <a:r>
+              <a:rPr lang="fr-FR" sz="1400" dirty="0" err="1"/>
+              <a:t>Paypal</a:t>
+            </a:r>
+            <a:r>
+              <a:rPr lang="fr-FR" sz="1400" dirty="0"/>
+              <a:t> (et qu’il est retourné à cette même page E3), le message ci-dessous est affiché, et les boutons de choix de paiement sont masqués.</a:t>
+            </a:r>
+          </a:p>
+        </p:txBody>
+      </p:sp>
+      <p:pic>
+        <p:nvPicPr>
+          <p:cNvPr id="5" name="Image 4"/>
+          <p:cNvPicPr>
+            <a:picLocks noChangeAspect="1"/>
+          </p:cNvPicPr>
+          <p:nvPr/>
+        </p:nvPicPr>
+        <p:blipFill>
+          <a:blip r:embed="rId2"/>
+          <a:stretch>
+            <a:fillRect/>
+          </a:stretch>
+        </p:blipFill>
+        <p:spPr>
+          <a:xfrm>
+            <a:off x="1021492" y="3214874"/>
+            <a:ext cx="4949711" cy="2878299"/>
+          </a:xfrm>
+          <a:prstGeom prst="rect">
+            <a:avLst/>
+          </a:prstGeom>
+        </p:spPr>
+      </p:pic>
+      <p:pic>
+        <p:nvPicPr>
+          <p:cNvPr id="6" name="Image 5"/>
+          <p:cNvPicPr>
+            <a:picLocks noChangeAspect="1"/>
+          </p:cNvPicPr>
+          <p:nvPr/>
+        </p:nvPicPr>
+        <p:blipFill>
+          <a:blip r:embed="rId3"/>
+          <a:stretch>
+            <a:fillRect/>
+          </a:stretch>
+        </p:blipFill>
+        <p:spPr>
+          <a:xfrm>
+            <a:off x="6566791" y="3214874"/>
+            <a:ext cx="4513101" cy="2914945"/>
+          </a:xfrm>
+          <a:prstGeom prst="rect">
+            <a:avLst/>
+          </a:prstGeom>
+        </p:spPr>
+      </p:pic>
+      <p:sp>
+        <p:nvSpPr>
+          <p:cNvPr id="7" name="ZoneTexte 6"/>
+          <p:cNvSpPr txBox="1"/>
+          <p:nvPr/>
+        </p:nvSpPr>
+        <p:spPr>
+          <a:xfrm>
+            <a:off x="2479589" y="2845542"/>
+            <a:ext cx="1495409" cy="369332"/>
+          </a:xfrm>
+          <a:prstGeom prst="rect">
+            <a:avLst/>
+          </a:prstGeom>
+          <a:noFill/>
+        </p:spPr>
+        <p:txBody>
+          <a:bodyPr wrap="none" rtlCol="0">
+            <a:spAutoFit/>
+          </a:bodyPr>
+          <a:lstStyle/>
+          <a:p>
+            <a:r>
+              <a:rPr lang="fr-FR" dirty="0"/>
+              <a:t>1</a:t>
+            </a:r>
+            <a:r>
+              <a:rPr lang="fr-FR" baseline="30000" dirty="0"/>
+              <a:t>ère</a:t>
+            </a:r>
+            <a:r>
+              <a:rPr lang="fr-FR" dirty="0"/>
+              <a:t> fois </a:t>
+            </a:r>
+            <a:r>
+              <a:rPr lang="fr-FR" dirty="0" err="1"/>
+              <a:t>Stripe</a:t>
+            </a:r>
+            <a:endParaRPr lang="fr-FR" dirty="0"/>
+          </a:p>
+        </p:txBody>
+      </p:sp>
+      <p:sp>
+        <p:nvSpPr>
+          <p:cNvPr id="8" name="ZoneTexte 7"/>
+          <p:cNvSpPr txBox="1"/>
+          <p:nvPr/>
+        </p:nvSpPr>
+        <p:spPr>
+          <a:xfrm>
+            <a:off x="7640594" y="2845542"/>
+            <a:ext cx="2697277" cy="369332"/>
+          </a:xfrm>
+          <a:prstGeom prst="rect">
+            <a:avLst/>
+          </a:prstGeom>
+          <a:noFill/>
+        </p:spPr>
+        <p:txBody>
+          <a:bodyPr wrap="none" rtlCol="0">
+            <a:spAutoFit/>
+          </a:bodyPr>
+          <a:lstStyle/>
+          <a:p>
+            <a:r>
+              <a:rPr lang="fr-FR" dirty="0" err="1"/>
+              <a:t>Paypal</a:t>
+            </a:r>
+            <a:r>
+              <a:rPr lang="fr-FR" dirty="0"/>
+              <a:t> et Nième fois </a:t>
+            </a:r>
+            <a:r>
+              <a:rPr lang="fr-FR" dirty="0" err="1"/>
+              <a:t>Stripe</a:t>
+            </a:r>
+            <a:endParaRPr lang="fr-FR" dirty="0"/>
+          </a:p>
+        </p:txBody>
+      </p:sp>
+      <p:pic>
+        <p:nvPicPr>
+          <p:cNvPr id="9" name="Image 8"/>
+          <p:cNvPicPr/>
+          <p:nvPr/>
+        </p:nvPicPr>
+        <p:blipFill>
+          <a:blip r:embed="rId4"/>
+          <a:stretch>
+            <a:fillRect/>
+          </a:stretch>
+        </p:blipFill>
+        <p:spPr>
+          <a:xfrm>
+            <a:off x="6481823" y="55943"/>
+            <a:ext cx="5629312" cy="1054400"/>
+          </a:xfrm>
+          <a:prstGeom prst="rect">
+            <a:avLst/>
+          </a:prstGeom>
+        </p:spPr>
+      </p:pic>
+      <p:sp>
+        <p:nvSpPr>
+          <p:cNvPr id="10" name="Rectangle à coins arrondis 9"/>
+          <p:cNvSpPr/>
+          <p:nvPr/>
+        </p:nvSpPr>
+        <p:spPr>
+          <a:xfrm>
+            <a:off x="10641353" y="583143"/>
+            <a:ext cx="877078" cy="457200"/>
+          </a:xfrm>
+          <a:prstGeom prst="roundRect">
+            <a:avLst/>
+          </a:prstGeom>
+          <a:noFill/>
+          <a:ln w="28575">
+            <a:solidFill>
+              <a:schemeClr val="tx1"/>
+            </a:solidFill>
+          </a:ln>
+        </p:spPr>
+        <p:style>
+          <a:lnRef idx="2">
+            <a:schemeClr val="accent1">
+              <a:shade val="50000"/>
+            </a:schemeClr>
+          </a:lnRef>
+          <a:fillRef idx="1">
+            <a:schemeClr val="accent1"/>
+          </a:fillRef>
+          <a:effectRef idx="0">
+            <a:schemeClr val="accent1"/>
+          </a:effectRef>
+          <a:fontRef idx="minor">
+            <a:schemeClr val="lt1"/>
+          </a:fontRef>
+        </p:style>
+        <p:txBody>
+          <a:bodyPr rtlCol="0" anchor="ctr"/>
+          <a:lstStyle/>
+          <a:p>
+            <a:pPr algn="ctr"/>
+            <a:endParaRPr lang="fr-FR"/>
+          </a:p>
+        </p:txBody>
+      </p:sp>
+    </p:spTree>
+    <p:extLst>
+      <p:ext uri="{BB962C8B-B14F-4D97-AF65-F5344CB8AC3E}">
+        <p14:creationId xmlns:p14="http://schemas.microsoft.com/office/powerpoint/2010/main" val="1718040375"/>
+      </p:ext>
+    </p:extLst>
+  </p:cSld>
+  <p:clrMapOvr>
+    <a:masterClrMapping/>
+  </p:clrMapOvr>
+</p:sld>
+</file>
+
+<file path=ppt/slides/slide8.xml><?xml version="1.0" encoding="utf-8"?>
+<p:sld xmlns:a="http://schemas.openxmlformats.org/drawingml/2006/main" xmlns:r="http://schemas.openxmlformats.org/officeDocument/2006/relationships" xmlns:p="http://schemas.openxmlformats.org/presentationml/2006/main">
+  <p:cSld>
+    <p:spTree>
+      <p:nvGrpSpPr>
+        <p:cNvPr id="1" name=""/>
+        <p:cNvGrpSpPr/>
+        <p:nvPr/>
+      </p:nvGrpSpPr>
+      <p:grpSpPr>
+        <a:xfrm>
+          <a:off x="0" y="0"/>
+          <a:ext cx="0" cy="0"/>
+          <a:chOff x="0" y="0"/>
+          <a:chExt cx="0" cy="0"/>
+        </a:xfrm>
+      </p:grpSpPr>
+      <p:sp>
+        <p:nvSpPr>
+          <p:cNvPr id="2" name="Titre 1"/>
+          <p:cNvSpPr>
+            <a:spLocks noGrp="1"/>
+          </p:cNvSpPr>
+          <p:nvPr>
+            <p:ph type="title"/>
+          </p:nvPr>
+        </p:nvSpPr>
+        <p:spPr/>
+        <p:txBody>
+          <a:bodyPr/>
+          <a:lstStyle/>
+          <a:p>
+            <a:r>
+              <a:rPr lang="fr-FR" dirty="0"/>
+              <a:t>Le mail d’envoi des billets</a:t>
+            </a:r>
+          </a:p>
+        </p:txBody>
+      </p:sp>
+      <p:pic>
+        <p:nvPicPr>
+          <p:cNvPr id="4" name="Image 3"/>
+          <p:cNvPicPr>
+            <a:picLocks noChangeAspect="1"/>
+          </p:cNvPicPr>
+          <p:nvPr/>
+        </p:nvPicPr>
+        <p:blipFill>
+          <a:blip r:embed="rId2"/>
+          <a:stretch>
+            <a:fillRect/>
+          </a:stretch>
+        </p:blipFill>
+        <p:spPr>
+          <a:xfrm>
+            <a:off x="1097280" y="1944150"/>
+            <a:ext cx="5262854" cy="3872806"/>
+          </a:xfrm>
+          <a:prstGeom prst="rect">
+            <a:avLst/>
+          </a:prstGeom>
+          <a:ln>
+            <a:solidFill>
+              <a:schemeClr val="tx1"/>
+            </a:solidFill>
+          </a:ln>
+        </p:spPr>
+      </p:pic>
+      <p:pic>
+        <p:nvPicPr>
+          <p:cNvPr id="5" name="Image 4"/>
+          <p:cNvPicPr/>
+          <p:nvPr/>
+        </p:nvPicPr>
+        <p:blipFill>
+          <a:blip r:embed="rId3"/>
+          <a:stretch>
+            <a:fillRect/>
+          </a:stretch>
+        </p:blipFill>
+        <p:spPr>
+          <a:xfrm>
+            <a:off x="6481823" y="55943"/>
+            <a:ext cx="5629312" cy="1054400"/>
+          </a:xfrm>
+          <a:prstGeom prst="rect">
+            <a:avLst/>
+          </a:prstGeom>
+        </p:spPr>
+      </p:pic>
+      <p:sp>
+        <p:nvSpPr>
+          <p:cNvPr id="6" name="Rectangle à coins arrondis 5"/>
+          <p:cNvSpPr/>
+          <p:nvPr/>
+        </p:nvSpPr>
+        <p:spPr>
+          <a:xfrm>
+            <a:off x="10646229" y="583143"/>
+            <a:ext cx="877078" cy="457200"/>
+          </a:xfrm>
+          <a:prstGeom prst="roundRect">
+            <a:avLst/>
+          </a:prstGeom>
+          <a:noFill/>
+          <a:ln w="28575">
+            <a:solidFill>
+              <a:schemeClr val="tx1"/>
+            </a:solidFill>
+          </a:ln>
+        </p:spPr>
+        <p:style>
+          <a:lnRef idx="2">
+            <a:schemeClr val="accent1">
+              <a:shade val="50000"/>
+            </a:schemeClr>
+          </a:lnRef>
+          <a:fillRef idx="1">
+            <a:schemeClr val="accent1"/>
+          </a:fillRef>
+          <a:effectRef idx="0">
+            <a:schemeClr val="accent1"/>
+          </a:effectRef>
+          <a:fontRef idx="minor">
+            <a:schemeClr val="lt1"/>
+          </a:fontRef>
+        </p:style>
+        <p:txBody>
+          <a:bodyPr rtlCol="0" anchor="ctr"/>
+          <a:lstStyle/>
+          <a:p>
+            <a:pPr algn="ctr"/>
+            <a:endParaRPr lang="fr-FR"/>
+          </a:p>
+        </p:txBody>
+      </p:sp>
+    </p:spTree>
+    <p:extLst>
+      <p:ext uri="{BB962C8B-B14F-4D97-AF65-F5344CB8AC3E}">
+        <p14:creationId xmlns:p14="http://schemas.microsoft.com/office/powerpoint/2010/main" val="2373722978"/>
+      </p:ext>
+    </p:extLst>
+  </p:cSld>
+  <p:clrMapOvr>
+    <a:masterClrMapping/>
+  </p:clrMapOvr>
+</p:sld>
+</file>
+
+<file path=ppt/slides/slide9.xml><?xml version="1.0" encoding="utf-8"?>
+<p:sld xmlns:a="http://schemas.openxmlformats.org/drawingml/2006/main" xmlns:r="http://schemas.openxmlformats.org/officeDocument/2006/relationships" xmlns:p="http://schemas.openxmlformats.org/presentationml/2006/main">
+  <p:cSld>
+    <p:spTree>
+      <p:nvGrpSpPr>
+        <p:cNvPr id="1" name=""/>
+        <p:cNvGrpSpPr/>
+        <p:nvPr/>
+      </p:nvGrpSpPr>
+      <p:grpSpPr>
+        <a:xfrm>
+          <a:off x="0" y="0"/>
+          <a:ext cx="0" cy="0"/>
+          <a:chOff x="0" y="0"/>
+          <a:chExt cx="0" cy="0"/>
+        </a:xfrm>
+      </p:grpSpPr>
+      <p:sp>
+        <p:nvSpPr>
+          <p:cNvPr id="2" name="Titre 1"/>
+          <p:cNvSpPr>
+            <a:spLocks noGrp="1"/>
+          </p:cNvSpPr>
+          <p:nvPr>
+            <p:ph type="title"/>
+          </p:nvPr>
+        </p:nvSpPr>
+        <p:spPr/>
+        <p:txBody>
+          <a:bodyPr/>
+          <a:lstStyle/>
+          <a:p>
+            <a:r>
+              <a:rPr lang="fr-FR" dirty="0"/>
+              <a:t>Les Billets envoyés (PDF)</a:t>
+            </a:r>
+          </a:p>
+        </p:txBody>
+      </p:sp>
+      <p:pic>
+        <p:nvPicPr>
+          <p:cNvPr id="4" name="Image 3"/>
+          <p:cNvPicPr>
+            <a:picLocks noChangeAspect="1"/>
+          </p:cNvPicPr>
+          <p:nvPr/>
+        </p:nvPicPr>
+        <p:blipFill>
+          <a:blip r:embed="rId2"/>
+          <a:stretch>
+            <a:fillRect/>
+          </a:stretch>
+        </p:blipFill>
+        <p:spPr>
+          <a:xfrm>
+            <a:off x="1991945" y="2624787"/>
+            <a:ext cx="7477125" cy="2905125"/>
+          </a:xfrm>
+          <a:prstGeom prst="rect">
+            <a:avLst/>
+          </a:prstGeom>
+        </p:spPr>
+      </p:pic>
+      <p:sp>
+        <p:nvSpPr>
+          <p:cNvPr id="5" name="Rectangle à coins arrondis 4"/>
+          <p:cNvSpPr/>
+          <p:nvPr/>
+        </p:nvSpPr>
+        <p:spPr>
+          <a:xfrm>
+            <a:off x="3648269" y="3293707"/>
+            <a:ext cx="1847462" cy="446272"/>
+          </a:xfrm>
+          <a:prstGeom prst="roundRect">
+            <a:avLst/>
+          </a:prstGeom>
+          <a:noFill/>
+          <a:ln w="28575">
+            <a:solidFill>
+              <a:srgbClr val="C00000"/>
+            </a:solidFill>
+          </a:ln>
+        </p:spPr>
+        <p:style>
+          <a:lnRef idx="2">
+            <a:schemeClr val="accent1">
+              <a:shade val="50000"/>
+            </a:schemeClr>
+          </a:lnRef>
+          <a:fillRef idx="1">
+            <a:schemeClr val="accent1"/>
+          </a:fillRef>
+          <a:effectRef idx="0">
+            <a:schemeClr val="accent1"/>
+          </a:effectRef>
+          <a:fontRef idx="minor">
+            <a:schemeClr val="lt1"/>
+          </a:fontRef>
+        </p:style>
+        <p:txBody>
+          <a:bodyPr rtlCol="0" anchor="ctr"/>
+          <a:lstStyle/>
+          <a:p>
+            <a:pPr algn="ctr"/>
+            <a:endParaRPr lang="fr-FR"/>
+          </a:p>
+        </p:txBody>
+      </p:sp>
+      <p:sp>
+        <p:nvSpPr>
+          <p:cNvPr id="6" name="ZoneTexte 5"/>
+          <p:cNvSpPr txBox="1"/>
+          <p:nvPr/>
+        </p:nvSpPr>
+        <p:spPr>
+          <a:xfrm>
+            <a:off x="2842054" y="2013240"/>
+            <a:ext cx="3804439" cy="369332"/>
+          </a:xfrm>
+          <a:prstGeom prst="rect">
+            <a:avLst/>
+          </a:prstGeom>
+          <a:noFill/>
+        </p:spPr>
+        <p:txBody>
+          <a:bodyPr wrap="none" rtlCol="0">
+            <a:spAutoFit/>
+          </a:bodyPr>
+          <a:lstStyle/>
+          <a:p>
+            <a:r>
+              <a:rPr lang="fr-FR" dirty="0"/>
+              <a:t>Zone indiquant le tarif associé au billet</a:t>
+            </a:r>
+          </a:p>
+        </p:txBody>
+      </p:sp>
+      <p:cxnSp>
+        <p:nvCxnSpPr>
+          <p:cNvPr id="8" name="Connecteur droit avec flèche 7"/>
+          <p:cNvCxnSpPr>
+            <a:stCxn id="5" idx="0"/>
+          </p:cNvCxnSpPr>
+          <p:nvPr/>
+        </p:nvCxnSpPr>
+        <p:spPr>
+          <a:xfrm flipV="1">
+            <a:off x="4572000" y="2416853"/>
+            <a:ext cx="0" cy="876854"/>
+          </a:xfrm>
+          <a:prstGeom prst="straightConnector1">
+            <a:avLst/>
+          </a:prstGeom>
+          <a:ln>
+            <a:solidFill>
+              <a:srgbClr val="C00000"/>
+            </a:solidFill>
+            <a:tailEnd type="triangle"/>
+          </a:ln>
+        </p:spPr>
+        <p:style>
+          <a:lnRef idx="1">
+            <a:schemeClr val="accent1"/>
+          </a:lnRef>
+          <a:fillRef idx="0">
+            <a:schemeClr val="accent1"/>
+          </a:fillRef>
+          <a:effectRef idx="0">
+            <a:schemeClr val="accent1"/>
+          </a:effectRef>
+          <a:fontRef idx="minor">
+            <a:schemeClr val="tx1"/>
+          </a:fontRef>
+        </p:style>
+      </p:cxnSp>
+      <p:sp>
+        <p:nvSpPr>
+          <p:cNvPr id="9" name="Rectangle à coins arrondis 8"/>
+          <p:cNvSpPr/>
+          <p:nvPr/>
+        </p:nvSpPr>
+        <p:spPr>
+          <a:xfrm>
+            <a:off x="7309987" y="2951835"/>
+            <a:ext cx="2072909" cy="952899"/>
+          </a:xfrm>
+          <a:prstGeom prst="roundRect">
+            <a:avLst/>
+          </a:prstGeom>
+          <a:noFill/>
+          <a:ln w="28575">
+            <a:solidFill>
+              <a:srgbClr val="C00000"/>
+            </a:solidFill>
+          </a:ln>
+        </p:spPr>
+        <p:style>
+          <a:lnRef idx="2">
+            <a:schemeClr val="accent1">
+              <a:shade val="50000"/>
+            </a:schemeClr>
+          </a:lnRef>
+          <a:fillRef idx="1">
+            <a:schemeClr val="accent1"/>
+          </a:fillRef>
+          <a:effectRef idx="0">
+            <a:schemeClr val="accent1"/>
+          </a:effectRef>
+          <a:fontRef idx="minor">
+            <a:schemeClr val="lt1"/>
+          </a:fontRef>
+        </p:style>
+        <p:txBody>
+          <a:bodyPr rtlCol="0" anchor="ctr"/>
+          <a:lstStyle/>
+          <a:p>
+            <a:pPr algn="ctr"/>
+            <a:endParaRPr lang="fr-FR"/>
+          </a:p>
+        </p:txBody>
+      </p:sp>
+      <p:sp>
+        <p:nvSpPr>
+          <p:cNvPr id="10" name="ZoneTexte 9"/>
+          <p:cNvSpPr txBox="1"/>
+          <p:nvPr/>
+        </p:nvSpPr>
+        <p:spPr>
+          <a:xfrm>
+            <a:off x="6936260" y="2013240"/>
+            <a:ext cx="4099520" cy="369332"/>
+          </a:xfrm>
+          <a:prstGeom prst="rect">
+            <a:avLst/>
+          </a:prstGeom>
+          <a:noFill/>
+        </p:spPr>
+        <p:txBody>
+          <a:bodyPr wrap="none" rtlCol="0">
+            <a:spAutoFit/>
+          </a:bodyPr>
+          <a:lstStyle/>
+          <a:p>
+            <a:r>
+              <a:rPr lang="fr-FR" dirty="0"/>
+              <a:t>Zone indiquant le jour de validité du billet</a:t>
+            </a:r>
+          </a:p>
+        </p:txBody>
+      </p:sp>
+      <p:cxnSp>
+        <p:nvCxnSpPr>
+          <p:cNvPr id="11" name="Connecteur droit avec flèche 10"/>
+          <p:cNvCxnSpPr/>
+          <p:nvPr/>
+        </p:nvCxnSpPr>
+        <p:spPr>
+          <a:xfrm flipV="1">
+            <a:off x="8346441" y="2382572"/>
+            <a:ext cx="0" cy="569263"/>
+          </a:xfrm>
+          <a:prstGeom prst="straightConnector1">
+            <a:avLst/>
+          </a:prstGeom>
+          <a:ln>
+            <a:solidFill>
+              <a:srgbClr val="C00000"/>
+            </a:solidFill>
+            <a:tailEnd type="triangle"/>
+          </a:ln>
+        </p:spPr>
+        <p:style>
+          <a:lnRef idx="1">
+            <a:schemeClr val="accent1"/>
+          </a:lnRef>
+          <a:fillRef idx="0">
+            <a:schemeClr val="accent1"/>
+          </a:fillRef>
+          <a:effectRef idx="0">
+            <a:schemeClr val="accent1"/>
+          </a:effectRef>
+          <a:fontRef idx="minor">
+            <a:schemeClr val="tx1"/>
+          </a:fontRef>
+        </p:style>
+      </p:cxnSp>
+      <p:sp>
+        <p:nvSpPr>
+          <p:cNvPr id="13" name="Rectangle à coins arrondis 12"/>
+          <p:cNvSpPr/>
+          <p:nvPr/>
+        </p:nvSpPr>
+        <p:spPr>
+          <a:xfrm>
+            <a:off x="2099554" y="4077350"/>
+            <a:ext cx="2072909" cy="750024"/>
+          </a:xfrm>
+          <a:prstGeom prst="roundRect">
+            <a:avLst/>
+          </a:prstGeom>
+          <a:noFill/>
+          <a:ln w="28575">
+            <a:solidFill>
+              <a:srgbClr val="C00000"/>
+            </a:solidFill>
+          </a:ln>
+        </p:spPr>
+        <p:style>
+          <a:lnRef idx="2">
+            <a:schemeClr val="accent1">
+              <a:shade val="50000"/>
+            </a:schemeClr>
+          </a:lnRef>
+          <a:fillRef idx="1">
+            <a:schemeClr val="accent1"/>
+          </a:fillRef>
+          <a:effectRef idx="0">
+            <a:schemeClr val="accent1"/>
+          </a:effectRef>
+          <a:fontRef idx="minor">
+            <a:schemeClr val="lt1"/>
+          </a:fontRef>
+        </p:style>
+        <p:txBody>
+          <a:bodyPr rtlCol="0" anchor="ctr"/>
+          <a:lstStyle/>
+          <a:p>
+            <a:pPr algn="ctr"/>
+            <a:endParaRPr lang="fr-FR"/>
+          </a:p>
+        </p:txBody>
+      </p:sp>
+      <p:cxnSp>
+        <p:nvCxnSpPr>
+          <p:cNvPr id="14" name="Connecteur droit avec flèche 13"/>
+          <p:cNvCxnSpPr>
+            <a:stCxn id="13" idx="1"/>
+          </p:cNvCxnSpPr>
+          <p:nvPr/>
+        </p:nvCxnSpPr>
+        <p:spPr>
+          <a:xfrm flipH="1" flipV="1">
+            <a:off x="1746422" y="4300152"/>
+            <a:ext cx="353132" cy="152210"/>
+          </a:xfrm>
+          <a:prstGeom prst="straightConnector1">
+            <a:avLst/>
+          </a:prstGeom>
+          <a:ln>
+            <a:solidFill>
+              <a:srgbClr val="C00000"/>
+            </a:solidFill>
+            <a:tailEnd type="triangle"/>
+          </a:ln>
+        </p:spPr>
+        <p:style>
+          <a:lnRef idx="1">
+            <a:schemeClr val="accent1"/>
+          </a:lnRef>
+          <a:fillRef idx="0">
+            <a:schemeClr val="accent1"/>
+          </a:fillRef>
+          <a:effectRef idx="0">
+            <a:schemeClr val="accent1"/>
+          </a:effectRef>
+          <a:fontRef idx="minor">
+            <a:schemeClr val="tx1"/>
+          </a:fontRef>
+        </p:style>
+      </p:cxnSp>
+      <p:sp>
+        <p:nvSpPr>
+          <p:cNvPr id="17" name="ZoneTexte 16"/>
+          <p:cNvSpPr txBox="1"/>
+          <p:nvPr/>
+        </p:nvSpPr>
+        <p:spPr>
+          <a:xfrm>
+            <a:off x="49794" y="3550777"/>
+            <a:ext cx="1696628" cy="923330"/>
+          </a:xfrm>
+          <a:prstGeom prst="rect">
+            <a:avLst/>
+          </a:prstGeom>
+          <a:noFill/>
+        </p:spPr>
+        <p:txBody>
+          <a:bodyPr wrap="square" rtlCol="0">
+            <a:spAutoFit/>
+          </a:bodyPr>
+          <a:lstStyle/>
+          <a:p>
+            <a:r>
+              <a:rPr lang="fr-FR" dirty="0"/>
+              <a:t>Zone indiquant le bénéficiaire du billet</a:t>
+            </a:r>
+          </a:p>
+        </p:txBody>
+      </p:sp>
+      <p:sp>
+        <p:nvSpPr>
+          <p:cNvPr id="18" name="Rectangle à coins arrondis 17"/>
+          <p:cNvSpPr/>
+          <p:nvPr/>
+        </p:nvSpPr>
+        <p:spPr>
+          <a:xfrm>
+            <a:off x="7771305" y="4001245"/>
+            <a:ext cx="1697765" cy="1419252"/>
+          </a:xfrm>
+          <a:prstGeom prst="roundRect">
+            <a:avLst/>
+          </a:prstGeom>
+          <a:noFill/>
+          <a:ln w="28575">
+            <a:solidFill>
+              <a:srgbClr val="C00000"/>
+            </a:solidFill>
+          </a:ln>
+        </p:spPr>
+        <p:style>
+          <a:lnRef idx="2">
+            <a:schemeClr val="accent1">
+              <a:shade val="50000"/>
+            </a:schemeClr>
+          </a:lnRef>
+          <a:fillRef idx="1">
+            <a:schemeClr val="accent1"/>
+          </a:fillRef>
+          <a:effectRef idx="0">
+            <a:schemeClr val="accent1"/>
+          </a:effectRef>
+          <a:fontRef idx="minor">
+            <a:schemeClr val="lt1"/>
+          </a:fontRef>
+        </p:style>
+        <p:txBody>
+          <a:bodyPr rtlCol="0" anchor="ctr"/>
+          <a:lstStyle/>
+          <a:p>
+            <a:pPr algn="ctr"/>
+            <a:endParaRPr lang="fr-FR"/>
+          </a:p>
+        </p:txBody>
+      </p:sp>
+      <p:cxnSp>
+        <p:nvCxnSpPr>
+          <p:cNvPr id="19" name="Connecteur droit avec flèche 18"/>
+          <p:cNvCxnSpPr>
+            <a:stCxn id="18" idx="3"/>
+          </p:cNvCxnSpPr>
+          <p:nvPr/>
+        </p:nvCxnSpPr>
+        <p:spPr>
+          <a:xfrm>
+            <a:off x="9469070" y="4710871"/>
+            <a:ext cx="416335" cy="0"/>
+          </a:xfrm>
+          <a:prstGeom prst="straightConnector1">
+            <a:avLst/>
+          </a:prstGeom>
+          <a:ln>
+            <a:solidFill>
+              <a:srgbClr val="C00000"/>
+            </a:solidFill>
+            <a:tailEnd type="triangle"/>
+          </a:ln>
+        </p:spPr>
+        <p:style>
+          <a:lnRef idx="1">
+            <a:schemeClr val="accent1"/>
+          </a:lnRef>
+          <a:fillRef idx="0">
+            <a:schemeClr val="accent1"/>
+          </a:fillRef>
+          <a:effectRef idx="0">
+            <a:schemeClr val="accent1"/>
+          </a:effectRef>
+          <a:fontRef idx="minor">
+            <a:schemeClr val="tx1"/>
+          </a:fontRef>
+        </p:style>
+      </p:cxnSp>
+      <p:sp>
+        <p:nvSpPr>
+          <p:cNvPr id="22" name="ZoneTexte 21"/>
+          <p:cNvSpPr txBox="1"/>
+          <p:nvPr/>
+        </p:nvSpPr>
+        <p:spPr>
+          <a:xfrm>
+            <a:off x="9885405" y="3930820"/>
+            <a:ext cx="2049760" cy="1754326"/>
+          </a:xfrm>
+          <a:prstGeom prst="rect">
+            <a:avLst/>
+          </a:prstGeom>
+          <a:noFill/>
+        </p:spPr>
+        <p:txBody>
+          <a:bodyPr wrap="square" rtlCol="0">
+            <a:spAutoFit/>
+          </a:bodyPr>
+          <a:lstStyle/>
+          <a:p>
+            <a:r>
+              <a:rPr lang="fr-FR" dirty="0"/>
+              <a:t>QR code renvoyant sur le site de </a:t>
+            </a:r>
+            <a:r>
+              <a:rPr lang="fr-FR" dirty="0" err="1"/>
+              <a:t>billeterie</a:t>
+            </a:r>
+            <a:r>
+              <a:rPr lang="fr-FR" dirty="0"/>
+              <a:t> à une page représentant ce même billet sous forme html</a:t>
+            </a:r>
+          </a:p>
+        </p:txBody>
+      </p:sp>
+      <p:pic>
+        <p:nvPicPr>
+          <p:cNvPr id="23" name="Image 22"/>
+          <p:cNvPicPr/>
+          <p:nvPr/>
+        </p:nvPicPr>
+        <p:blipFill>
+          <a:blip r:embed="rId3"/>
+          <a:stretch>
+            <a:fillRect/>
+          </a:stretch>
+        </p:blipFill>
+        <p:spPr>
+          <a:xfrm>
+            <a:off x="6481823" y="55943"/>
+            <a:ext cx="5629312" cy="1054400"/>
+          </a:xfrm>
+          <a:prstGeom prst="rect">
+            <a:avLst/>
+          </a:prstGeom>
+        </p:spPr>
+      </p:pic>
+      <p:sp>
+        <p:nvSpPr>
+          <p:cNvPr id="24" name="Rectangle à coins arrondis 23"/>
+          <p:cNvSpPr/>
+          <p:nvPr/>
+        </p:nvSpPr>
+        <p:spPr>
+          <a:xfrm>
+            <a:off x="10674858" y="583143"/>
+            <a:ext cx="877078" cy="457200"/>
+          </a:xfrm>
+          <a:prstGeom prst="roundRect">
+            <a:avLst/>
+          </a:prstGeom>
+          <a:noFill/>
+          <a:ln w="28575">
+            <a:solidFill>
+              <a:schemeClr val="tx1"/>
+            </a:solidFill>
+          </a:ln>
+        </p:spPr>
+        <p:style>
+          <a:lnRef idx="2">
+            <a:schemeClr val="accent1">
+              <a:shade val="50000"/>
+            </a:schemeClr>
+          </a:lnRef>
+          <a:fillRef idx="1">
+            <a:schemeClr val="accent1"/>
+          </a:fillRef>
+          <a:effectRef idx="0">
+            <a:schemeClr val="accent1"/>
+          </a:effectRef>
+          <a:fontRef idx="minor">
+            <a:schemeClr val="lt1"/>
+          </a:fontRef>
+        </p:style>
+        <p:txBody>
+          <a:bodyPr rtlCol="0" anchor="ctr"/>
+          <a:lstStyle/>
+          <a:p>
+            <a:pPr algn="ctr"/>
+            <a:endParaRPr lang="fr-FR"/>
+          </a:p>
+        </p:txBody>
+      </p:sp>
+    </p:spTree>
+    <p:extLst>
+      <p:ext uri="{BB962C8B-B14F-4D97-AF65-F5344CB8AC3E}">
+        <p14:creationId xmlns:p14="http://schemas.microsoft.com/office/powerpoint/2010/main" val="3438935870"/>
       </p:ext>
     </p:extLst>
   </p:cSld>

</xml_diff>

<commit_message>
Nettoyage Bundle devenu inutile et ajout boutons facebook et twitter
</commit_message>
<xml_diff>
--- a/documentation/Livrables/Descriptif fonctionnel.pptx
+++ b/documentation/Livrables/Descriptif fonctionnel.pptx
@@ -112,6 +112,11 @@
       </a:defRPr>
     </a:lvl9pPr>
   </p:defaultTextStyle>
+  <p:extLst>
+    <p:ext uri="{EFAFB233-063F-42B5-8137-9DF3F51BA10A}">
+      <p15:sldGuideLst xmlns:p15="http://schemas.microsoft.com/office/powerpoint/2012/main"/>
+    </p:ext>
+  </p:extLst>
 </p:presentation>
 </file>
 
@@ -4700,7 +4705,7 @@
           <a:p>
             <a:r>
               <a:rPr lang="fr-FR" sz="1100" dirty="0"/>
-              <a:t>Une zone synthétique indiquant le Tarif, son prix, ses condition et le nombre d’entrée auquel il donne droit.</a:t>
+              <a:t>Une zone synthétique indiquant le Tarif, son prix, ses conditions et le nombre d’entrée auquel il donne droit.</a:t>
             </a:r>
           </a:p>
         </p:txBody>
@@ -6231,7 +6236,7 @@
         </p:nvSpPr>
         <p:spPr>
           <a:xfrm>
-            <a:off x="6944497" y="914401"/>
+            <a:off x="6948364" y="1103316"/>
             <a:ext cx="4975654" cy="724860"/>
           </a:xfrm>
           <a:prstGeom prst="rect">

</xml_diff>